<commit_message>
add evidence search techniques
</commit_message>
<xml_diff>
--- a/NIST_Data_Leakage_Case/NIST_Data_Leakage_00_Env_Setting.pptx
+++ b/NIST_Data_Leakage_Case/NIST_Data_Leakage_00_Env_Setting.pptx
@@ -5,7 +5,7 @@
     <p:sldMasterId id="2147483648" r:id="rId1"/>
   </p:sldMasterIdLst>
   <p:notesMasterIdLst>
-    <p:notesMasterId r:id="rId48"/>
+    <p:notesMasterId r:id="rId47"/>
   </p:notesMasterIdLst>
   <p:sldIdLst>
     <p:sldId id="256" r:id="rId2"/>
@@ -51,9 +51,8 @@
     <p:sldId id="273" r:id="rId42"/>
     <p:sldId id="276" r:id="rId43"/>
     <p:sldId id="312" r:id="rId44"/>
-    <p:sldId id="313" r:id="rId45"/>
-    <p:sldId id="316" r:id="rId46"/>
-    <p:sldId id="317" r:id="rId47"/>
+    <p:sldId id="316" r:id="rId45"/>
+    <p:sldId id="317" r:id="rId46"/>
   </p:sldIdLst>
   <p:sldSz cx="12192000" cy="6858000"/>
   <p:notesSz cx="6858000" cy="9144000"/>
@@ -163,7 +162,7 @@
 <file path=ppt/revisionInfo.xml><?xml version="1.0" encoding="utf-8"?>
 <p1510:revInfo xmlns:a="http://schemas.openxmlformats.org/drawingml/2006/main" xmlns:r="http://schemas.openxmlformats.org/officeDocument/2006/relationships" xmlns:p1510="http://schemas.microsoft.com/office/powerpoint/2015/10/main">
   <p1510:revLst>
-    <p1510:client id="{FC29E0CB-EC29-4F0E-A782-58C19F5D3434}" v="24" dt="2021-09-07T14:16:42.462"/>
+    <p1510:client id="{FC29E0CB-EC29-4F0E-A782-58C19F5D3434}" v="27" dt="2021-09-20T16:28:05.669"/>
   </p1510:revLst>
 </p1510:revInfo>
 </file>
@@ -743,13 +742,13 @@
   </pc:docChgLst>
   <pc:docChgLst>
     <pc:chgData name="Weifeng Xu" userId="e7aed605-a3dd-4d5a-a692-a87037af107b" providerId="ADAL" clId="{FC29E0CB-EC29-4F0E-A782-58C19F5D3434}"/>
-    <pc:docChg chg="undo custSel addSld modSld">
-      <pc:chgData name="Weifeng Xu" userId="e7aed605-a3dd-4d5a-a692-a87037af107b" providerId="ADAL" clId="{FC29E0CB-EC29-4F0E-A782-58C19F5D3434}" dt="2021-09-07T14:16:52.059" v="561" actId="20577"/>
+    <pc:docChg chg="undo custSel addSld delSld modSld">
+      <pc:chgData name="Weifeng Xu" userId="e7aed605-a3dd-4d5a-a692-a87037af107b" providerId="ADAL" clId="{FC29E0CB-EC29-4F0E-A782-58C19F5D3434}" dt="2021-09-20T16:30:32.168" v="605"/>
       <pc:docMkLst>
         <pc:docMk/>
       </pc:docMkLst>
       <pc:sldChg chg="addSp delSp modSp mod modNotesTx">
-        <pc:chgData name="Weifeng Xu" userId="e7aed605-a3dd-4d5a-a692-a87037af107b" providerId="ADAL" clId="{FC29E0CB-EC29-4F0E-A782-58C19F5D3434}" dt="2021-09-07T13:51:34.640" v="546" actId="20577"/>
+        <pc:chgData name="Weifeng Xu" userId="e7aed605-a3dd-4d5a-a692-a87037af107b" providerId="ADAL" clId="{FC29E0CB-EC29-4F0E-A782-58C19F5D3434}" dt="2021-09-14T22:11:38.488" v="569"/>
         <pc:sldMkLst>
           <pc:docMk/>
           <pc:sldMk cId="878550910" sldId="265"/>
@@ -999,6 +998,76 @@
             <ac:spMk id="12" creationId="{00000000-0000-0000-0000-000000000000}"/>
           </ac:spMkLst>
         </pc:spChg>
+      </pc:sldChg>
+      <pc:sldChg chg="addSp delSp modSp mod modNotesTx">
+        <pc:chgData name="Weifeng Xu" userId="e7aed605-a3dd-4d5a-a692-a87037af107b" providerId="ADAL" clId="{FC29E0CB-EC29-4F0E-A782-58C19F5D3434}" dt="2021-09-20T16:30:32.168" v="605"/>
+        <pc:sldMkLst>
+          <pc:docMk/>
+          <pc:sldMk cId="2709583132" sldId="312"/>
+        </pc:sldMkLst>
+        <pc:spChg chg="add mod">
+          <ac:chgData name="Weifeng Xu" userId="e7aed605-a3dd-4d5a-a692-a87037af107b" providerId="ADAL" clId="{FC29E0CB-EC29-4F0E-A782-58C19F5D3434}" dt="2021-09-20T16:26:01.808" v="584" actId="1076"/>
+          <ac:spMkLst>
+            <pc:docMk/>
+            <pc:sldMk cId="2709583132" sldId="312"/>
+            <ac:spMk id="9" creationId="{42AB00D0-A53D-4C4A-AD91-3198853C39D3}"/>
+          </ac:spMkLst>
+        </pc:spChg>
+        <pc:spChg chg="add mod">
+          <ac:chgData name="Weifeng Xu" userId="e7aed605-a3dd-4d5a-a692-a87037af107b" providerId="ADAL" clId="{FC29E0CB-EC29-4F0E-A782-58C19F5D3434}" dt="2021-09-20T16:28:42.560" v="602" actId="20577"/>
+          <ac:spMkLst>
+            <pc:docMk/>
+            <pc:sldMk cId="2709583132" sldId="312"/>
+            <ac:spMk id="10" creationId="{5CBBF337-05C2-4F51-9743-8345B47BEFE1}"/>
+          </ac:spMkLst>
+        </pc:spChg>
+        <pc:picChg chg="del">
+          <ac:chgData name="Weifeng Xu" userId="e7aed605-a3dd-4d5a-a692-a87037af107b" providerId="ADAL" clId="{FC29E0CB-EC29-4F0E-A782-58C19F5D3434}" dt="2021-09-20T16:24:05.613" v="571" actId="478"/>
+          <ac:picMkLst>
+            <pc:docMk/>
+            <pc:sldMk cId="2709583132" sldId="312"/>
+            <ac:picMk id="2" creationId="{00000000-0000-0000-0000-000000000000}"/>
+          </ac:picMkLst>
+        </pc:picChg>
+        <pc:picChg chg="del">
+          <ac:chgData name="Weifeng Xu" userId="e7aed605-a3dd-4d5a-a692-a87037af107b" providerId="ADAL" clId="{FC29E0CB-EC29-4F0E-A782-58C19F5D3434}" dt="2021-09-20T16:24:06.557" v="572" actId="478"/>
+          <ac:picMkLst>
+            <pc:docMk/>
+            <pc:sldMk cId="2709583132" sldId="312"/>
+            <ac:picMk id="3" creationId="{00000000-0000-0000-0000-000000000000}"/>
+          </ac:picMkLst>
+        </pc:picChg>
+        <pc:picChg chg="add mod">
+          <ac:chgData name="Weifeng Xu" userId="e7aed605-a3dd-4d5a-a692-a87037af107b" providerId="ADAL" clId="{FC29E0CB-EC29-4F0E-A782-58C19F5D3434}" dt="2021-09-20T16:25:47.091" v="578" actId="14100"/>
+          <ac:picMkLst>
+            <pc:docMk/>
+            <pc:sldMk cId="2709583132" sldId="312"/>
+            <ac:picMk id="6" creationId="{BE5CE496-954B-408D-B364-D264BBF3B892}"/>
+          </ac:picMkLst>
+        </pc:picChg>
+        <pc:picChg chg="add mod">
+          <ac:chgData name="Weifeng Xu" userId="e7aed605-a3dd-4d5a-a692-a87037af107b" providerId="ADAL" clId="{FC29E0CB-EC29-4F0E-A782-58C19F5D3434}" dt="2021-09-20T16:25:53.096" v="582" actId="14100"/>
+          <ac:picMkLst>
+            <pc:docMk/>
+            <pc:sldMk cId="2709583132" sldId="312"/>
+            <ac:picMk id="8" creationId="{93BBF421-D4C8-4591-A1B2-F7CFA06BF3D8}"/>
+          </ac:picMkLst>
+        </pc:picChg>
+      </pc:sldChg>
+      <pc:sldChg chg="delSp del mod">
+        <pc:chgData name="Weifeng Xu" userId="e7aed605-a3dd-4d5a-a692-a87037af107b" providerId="ADAL" clId="{FC29E0CB-EC29-4F0E-A782-58C19F5D3434}" dt="2021-09-20T16:28:50.802" v="603" actId="47"/>
+        <pc:sldMkLst>
+          <pc:docMk/>
+          <pc:sldMk cId="3605786217" sldId="313"/>
+        </pc:sldMkLst>
+        <pc:picChg chg="del">
+          <ac:chgData name="Weifeng Xu" userId="e7aed605-a3dd-4d5a-a692-a87037af107b" providerId="ADAL" clId="{FC29E0CB-EC29-4F0E-A782-58C19F5D3434}" dt="2021-09-20T16:24:13.908" v="573" actId="478"/>
+          <ac:picMkLst>
+            <pc:docMk/>
+            <pc:sldMk cId="3605786217" sldId="313"/>
+            <ac:picMk id="7" creationId="{00000000-0000-0000-0000-000000000000}"/>
+          </ac:picMkLst>
+        </pc:picChg>
       </pc:sldChg>
       <pc:sldChg chg="modSp mod">
         <pc:chgData name="Weifeng Xu" userId="e7aed605-a3dd-4d5a-a692-a87037af107b" providerId="ADAL" clId="{FC29E0CB-EC29-4F0E-A782-58C19F5D3434}" dt="2021-08-24T15:43:46.165" v="270" actId="20577"/>
@@ -4996,7 +5065,7 @@
           <a:p>
             <a:fld id="{EE41F6E3-57F9-402E-BDBA-5B2DE11C8530}" type="datetimeFigureOut">
               <a:rPr lang="en-US" smtClean="0"/>
-              <a:t>9/7/2021</a:t>
+              <a:t>9/20/2021</a:t>
             </a:fld>
             <a:endParaRPr lang="en-US"/>
           </a:p>
@@ -5979,6 +6048,50 @@
           <a:bodyPr/>
           <a:lstStyle/>
           <a:p>
+            <a:r>
+              <a:rPr lang="en-US" dirty="0"/>
+              <a:t>https://github.com/PoorBillionaire/Windows-Prefetch-Parser.git</a:t>
+            </a:r>
+          </a:p>
+          <a:p>
+            <a:r>
+              <a:rPr lang="en-US" dirty="0" err="1"/>
+              <a:t>sudo</a:t>
+            </a:r>
+            <a:r>
+              <a:rPr lang="en-US" dirty="0"/>
+              <a:t> update-alternatives --install /</a:t>
+            </a:r>
+            <a:r>
+              <a:rPr lang="en-US" dirty="0" err="1"/>
+              <a:t>usr</a:t>
+            </a:r>
+            <a:r>
+              <a:rPr lang="en-US" dirty="0"/>
+              <a:t>/bin/python </a:t>
+            </a:r>
+            <a:r>
+              <a:rPr lang="en-US" dirty="0" err="1"/>
+              <a:t>python</a:t>
+            </a:r>
+            <a:r>
+              <a:rPr lang="en-US" dirty="0"/>
+              <a:t> /</a:t>
+            </a:r>
+            <a:r>
+              <a:rPr lang="en-US" dirty="0" err="1"/>
+              <a:t>usr</a:t>
+            </a:r>
+            <a:r>
+              <a:rPr lang="en-US" dirty="0"/>
+              <a:t>/bin/python3.9 1</a:t>
+            </a:r>
+          </a:p>
+          <a:p>
+            <a:r>
+              <a:rPr lang="en-US"/>
+              <a:t>https://medium.com/analytics-vidhya/how-to-install-and-switch-between-different-python-versions-in-ubuntu-16-04-dc1726796b9b</a:t>
+            </a:r>
             <a:endParaRPr lang="en-US" dirty="0"/>
           </a:p>
         </p:txBody>
@@ -6065,34 +6178,8 @@
           <a:p>
             <a:r>
               <a:rPr lang="en-US" dirty="0"/>
-              <a:t>Debug</a:t>
-            </a:r>
-          </a:p>
-          <a:p>
-            <a:endParaRPr lang="en-US" dirty="0">
-              <a:solidFill>
-                <a:srgbClr val="FF0000"/>
-              </a:solidFill>
-            </a:endParaRPr>
-          </a:p>
-          <a:p>
-            <a:r>
-              <a:rPr lang="en-US" dirty="0">
-                <a:solidFill>
-                  <a:srgbClr val="FF0000"/>
-                </a:solidFill>
-              </a:rPr>
-              <a:t>apt-ge</a:t>
-            </a:r>
-            <a:r>
-              <a:rPr lang="en-US" dirty="0"/>
-              <a:t>t install python-</a:t>
-            </a:r>
-            <a:r>
-              <a:rPr lang="en-US" dirty="0" err="1"/>
-              <a:t>setuptools</a:t>
-            </a:r>
-            <a:endParaRPr lang="en-US" dirty="0"/>
+              <a:t>Apt-get install python3-evtx</a:t>
+            </a:r>
           </a:p>
         </p:txBody>
       </p:sp>
@@ -6113,94 +6200,7 @@
           <a:p>
             <a:fld id="{DDBF98C7-164A-4723-84F0-B1E4B080DDEC}" type="slidenum">
               <a:rPr lang="en-US" smtClean="0"/>
-              <a:t>44</a:t>
-            </a:fld>
-            <a:endParaRPr lang="en-US"/>
-          </a:p>
-        </p:txBody>
-      </p:sp>
-    </p:spTree>
-    <p:extLst>
-      <p:ext uri="{BB962C8B-B14F-4D97-AF65-F5344CB8AC3E}">
-        <p14:creationId xmlns:p14="http://schemas.microsoft.com/office/powerpoint/2010/main" val="2032092198"/>
-      </p:ext>
-    </p:extLst>
-  </p:cSld>
-  <p:clrMapOvr>
-    <a:masterClrMapping/>
-  </p:clrMapOvr>
-</p:notes>
-</file>
-
-<file path=ppt/notesSlides/notesSlide17.xml><?xml version="1.0" encoding="utf-8"?>
-<p:notes xmlns:a="http://schemas.openxmlformats.org/drawingml/2006/main" xmlns:r="http://schemas.openxmlformats.org/officeDocument/2006/relationships" xmlns:p="http://schemas.openxmlformats.org/presentationml/2006/main">
-  <p:cSld>
-    <p:spTree>
-      <p:nvGrpSpPr>
-        <p:cNvPr id="1" name=""/>
-        <p:cNvGrpSpPr/>
-        <p:nvPr/>
-      </p:nvGrpSpPr>
-      <p:grpSpPr>
-        <a:xfrm>
-          <a:off x="0" y="0"/>
-          <a:ext cx="0" cy="0"/>
-          <a:chOff x="0" y="0"/>
-          <a:chExt cx="0" cy="0"/>
-        </a:xfrm>
-      </p:grpSpPr>
-      <p:sp>
-        <p:nvSpPr>
-          <p:cNvPr id="2" name="Slide Image Placeholder 1"/>
-          <p:cNvSpPr>
-            <a:spLocks noGrp="1" noRot="1" noChangeAspect="1"/>
-          </p:cNvSpPr>
-          <p:nvPr>
-            <p:ph type="sldImg"/>
-          </p:nvPr>
-        </p:nvSpPr>
-        <p:spPr/>
-      </p:sp>
-      <p:sp>
-        <p:nvSpPr>
-          <p:cNvPr id="3" name="Notes Placeholder 2"/>
-          <p:cNvSpPr>
-            <a:spLocks noGrp="1"/>
-          </p:cNvSpPr>
-          <p:nvPr>
-            <p:ph type="body" idx="1"/>
-          </p:nvPr>
-        </p:nvSpPr>
-        <p:spPr/>
-        <p:txBody>
-          <a:bodyPr/>
-          <a:lstStyle/>
-          <a:p>
-            <a:r>
-              <a:rPr lang="en-US" dirty="0"/>
-              <a:t>Apt-get install python3-evtx</a:t>
-            </a:r>
-          </a:p>
-        </p:txBody>
-      </p:sp>
-      <p:sp>
-        <p:nvSpPr>
-          <p:cNvPr id="4" name="Slide Number Placeholder 3"/>
-          <p:cNvSpPr>
-            <a:spLocks noGrp="1"/>
-          </p:cNvSpPr>
-          <p:nvPr>
-            <p:ph type="sldNum" sz="quarter" idx="10"/>
-          </p:nvPr>
-        </p:nvSpPr>
-        <p:spPr/>
-        <p:txBody>
-          <a:bodyPr/>
-          <a:lstStyle/>
-          <a:p>
-            <a:fld id="{DDBF98C7-164A-4723-84F0-B1E4B080DDEC}" type="slidenum">
-              <a:rPr lang="en-US" smtClean="0"/>
-              <a:t>46</a:t>
+              <a:t>45</a:t>
             </a:fld>
             <a:endParaRPr lang="en-US"/>
           </a:p>
@@ -6360,12 +6360,8 @@
           <a:lstStyle/>
           <a:p>
             <a:r>
-              <a:rPr lang="en-US" dirty="0" err="1"/>
-              <a:t>mkdir</a:t>
-            </a:r>
-            <a:r>
-              <a:rPr lang="en-US" dirty="0"/>
-              <a:t> cd lab</a:t>
+              <a:rPr lang="en-US" dirty="0"/>
+              <a:t>cd lab</a:t>
             </a:r>
           </a:p>
           <a:p>
@@ -7336,7 +7332,7 @@
           <a:p>
             <a:fld id="{4263717A-E3C1-4BED-ABE0-B7069385E023}" type="datetimeFigureOut">
               <a:rPr lang="en-US" smtClean="0"/>
-              <a:t>9/7/2021</a:t>
+              <a:t>9/20/2021</a:t>
             </a:fld>
             <a:endParaRPr lang="en-US"/>
           </a:p>
@@ -7509,7 +7505,7 @@
           <a:p>
             <a:fld id="{4263717A-E3C1-4BED-ABE0-B7069385E023}" type="datetimeFigureOut">
               <a:rPr lang="en-US" smtClean="0"/>
-              <a:t>9/7/2021</a:t>
+              <a:t>9/20/2021</a:t>
             </a:fld>
             <a:endParaRPr lang="en-US"/>
           </a:p>
@@ -7687,7 +7683,7 @@
           <a:p>
             <a:fld id="{4263717A-E3C1-4BED-ABE0-B7069385E023}" type="datetimeFigureOut">
               <a:rPr lang="en-US" smtClean="0"/>
-              <a:t>9/7/2021</a:t>
+              <a:t>9/20/2021</a:t>
             </a:fld>
             <a:endParaRPr lang="en-US"/>
           </a:p>
@@ -7855,7 +7851,7 @@
           <a:p>
             <a:fld id="{4263717A-E3C1-4BED-ABE0-B7069385E023}" type="datetimeFigureOut">
               <a:rPr lang="en-US" smtClean="0"/>
-              <a:t>9/7/2021</a:t>
+              <a:t>9/20/2021</a:t>
             </a:fld>
             <a:endParaRPr lang="en-US"/>
           </a:p>
@@ -8100,7 +8096,7 @@
           <a:p>
             <a:fld id="{4263717A-E3C1-4BED-ABE0-B7069385E023}" type="datetimeFigureOut">
               <a:rPr lang="en-US" smtClean="0"/>
-              <a:t>9/7/2021</a:t>
+              <a:t>9/20/2021</a:t>
             </a:fld>
             <a:endParaRPr lang="en-US"/>
           </a:p>
@@ -8329,7 +8325,7 @@
           <a:p>
             <a:fld id="{4263717A-E3C1-4BED-ABE0-B7069385E023}" type="datetimeFigureOut">
               <a:rPr lang="en-US" smtClean="0"/>
-              <a:t>9/7/2021</a:t>
+              <a:t>9/20/2021</a:t>
             </a:fld>
             <a:endParaRPr lang="en-US"/>
           </a:p>
@@ -8693,7 +8689,7 @@
           <a:p>
             <a:fld id="{4263717A-E3C1-4BED-ABE0-B7069385E023}" type="datetimeFigureOut">
               <a:rPr lang="en-US" smtClean="0"/>
-              <a:t>9/7/2021</a:t>
+              <a:t>9/20/2021</a:t>
             </a:fld>
             <a:endParaRPr lang="en-US"/>
           </a:p>
@@ -8810,7 +8806,7 @@
           <a:p>
             <a:fld id="{4263717A-E3C1-4BED-ABE0-B7069385E023}" type="datetimeFigureOut">
               <a:rPr lang="en-US" smtClean="0"/>
-              <a:t>9/7/2021</a:t>
+              <a:t>9/20/2021</a:t>
             </a:fld>
             <a:endParaRPr lang="en-US"/>
           </a:p>
@@ -8905,7 +8901,7 @@
           <a:p>
             <a:fld id="{4263717A-E3C1-4BED-ABE0-B7069385E023}" type="datetimeFigureOut">
               <a:rPr lang="en-US" smtClean="0"/>
-              <a:t>9/7/2021</a:t>
+              <a:t>9/20/2021</a:t>
             </a:fld>
             <a:endParaRPr lang="en-US"/>
           </a:p>
@@ -9180,7 +9176,7 @@
           <a:p>
             <a:fld id="{4263717A-E3C1-4BED-ABE0-B7069385E023}" type="datetimeFigureOut">
               <a:rPr lang="en-US" smtClean="0"/>
-              <a:t>9/7/2021</a:t>
+              <a:t>9/20/2021</a:t>
             </a:fld>
             <a:endParaRPr lang="en-US"/>
           </a:p>
@@ -9432,7 +9428,7 @@
           <a:p>
             <a:fld id="{4263717A-E3C1-4BED-ABE0-B7069385E023}" type="datetimeFigureOut">
               <a:rPr lang="en-US" smtClean="0"/>
-              <a:t>9/7/2021</a:t>
+              <a:t>9/20/2021</a:t>
             </a:fld>
             <a:endParaRPr lang="en-US"/>
           </a:p>
@@ -9643,7 +9639,7 @@
           <a:p>
             <a:fld id="{4263717A-E3C1-4BED-ABE0-B7069385E023}" type="datetimeFigureOut">
               <a:rPr lang="en-US" smtClean="0"/>
-              <a:t>9/7/2021</a:t>
+              <a:t>9/20/2021</a:t>
             </a:fld>
             <a:endParaRPr lang="en-US"/>
           </a:p>
@@ -17409,9 +17405,61 @@
           <a:chExt cx="0" cy="0"/>
         </a:xfrm>
       </p:grpSpPr>
+      <p:sp>
+        <p:nvSpPr>
+          <p:cNvPr id="4" name="Title 3"/>
+          <p:cNvSpPr>
+            <a:spLocks noGrp="1"/>
+          </p:cNvSpPr>
+          <p:nvPr>
+            <p:ph type="title"/>
+          </p:nvPr>
+        </p:nvSpPr>
+        <p:spPr/>
+        <p:txBody>
+          <a:bodyPr/>
+          <a:lstStyle/>
+          <a:p>
+            <a:r>
+              <a:rPr lang="en-US" dirty="0"/>
+              <a:t>7.3 Install </a:t>
+            </a:r>
+            <a:r>
+              <a:rPr lang="en-US" i="1" dirty="0">
+                <a:solidFill>
+                  <a:srgbClr val="007DB5"/>
+                </a:solidFill>
+              </a:rPr>
+              <a:t>Windows-</a:t>
+            </a:r>
+            <a:r>
+              <a:rPr lang="en-US" i="1" dirty="0" err="1">
+                <a:solidFill>
+                  <a:srgbClr val="007DB5"/>
+                </a:solidFill>
+              </a:rPr>
+              <a:t>Prefetch</a:t>
+            </a:r>
+            <a:r>
+              <a:rPr lang="en-US" i="1" dirty="0">
+                <a:solidFill>
+                  <a:srgbClr val="007DB5"/>
+                </a:solidFill>
+              </a:rPr>
+              <a:t>-Parser</a:t>
+            </a:r>
+          </a:p>
+        </p:txBody>
+      </p:sp>
       <p:pic>
         <p:nvPicPr>
-          <p:cNvPr id="2" name="Picture 1"/>
+          <p:cNvPr id="6" name="Picture 5">
+            <a:extLst>
+              <a:ext uri="{FF2B5EF4-FFF2-40B4-BE49-F238E27FC236}">
+                <a16:creationId xmlns:a16="http://schemas.microsoft.com/office/drawing/2014/main" id="{BE5CE496-954B-408D-B364-D264BBF3B892}"/>
+              </a:ext>
+            </a:extLst>
+          </p:cNvPr>
           <p:cNvPicPr>
             <a:picLocks noChangeAspect="1"/>
           </p:cNvPicPr>
@@ -17425,8 +17473,8 @@
         </p:blipFill>
         <p:spPr>
           <a:xfrm>
-            <a:off x="785580" y="1690688"/>
-            <a:ext cx="10773768" cy="2132575"/>
+            <a:off x="838199" y="1914573"/>
+            <a:ext cx="9455563" cy="1169286"/>
           </a:xfrm>
           <a:prstGeom prst="rect">
             <a:avLst/>
@@ -17435,7 +17483,13 @@
       </p:pic>
       <p:pic>
         <p:nvPicPr>
-          <p:cNvPr id="3" name="Picture 2"/>
+          <p:cNvPr id="8" name="Picture 7">
+            <a:extLst>
+              <a:ext uri="{FF2B5EF4-FFF2-40B4-BE49-F238E27FC236}">
+                <a16:creationId xmlns:a16="http://schemas.microsoft.com/office/drawing/2014/main" id="{93BBF421-D4C8-4591-A1B2-F7CFA06BF3D8}"/>
+              </a:ext>
+            </a:extLst>
+          </p:cNvPr>
           <p:cNvPicPr>
             <a:picLocks noChangeAspect="1"/>
           </p:cNvPicPr>
@@ -17449,8 +17503,8 @@
         </p:blipFill>
         <p:spPr>
           <a:xfrm>
-            <a:off x="796953" y="3898912"/>
-            <a:ext cx="9065429" cy="2325438"/>
+            <a:off x="838199" y="3879963"/>
+            <a:ext cx="9395206" cy="2305684"/>
           </a:xfrm>
           <a:prstGeom prst="rect">
             <a:avLst/>
@@ -17459,46 +17513,94 @@
       </p:pic>
       <p:sp>
         <p:nvSpPr>
-          <p:cNvPr id="4" name="Title 3"/>
-          <p:cNvSpPr>
-            <a:spLocks noGrp="1"/>
-          </p:cNvSpPr>
-          <p:nvPr>
-            <p:ph type="title"/>
-          </p:nvPr>
-        </p:nvSpPr>
-        <p:spPr/>
-        <p:txBody>
-          <a:bodyPr/>
-          <a:lstStyle/>
-          <a:p>
-            <a:r>
-              <a:rPr lang="en-US" dirty="0"/>
-              <a:t>7.3 Install </a:t>
-            </a:r>
-            <a:r>
-              <a:rPr lang="en-US" i="1" dirty="0">
+          <p:cNvPr id="9" name="TextBox 8">
+            <a:extLst>
+              <a:ext uri="{FF2B5EF4-FFF2-40B4-BE49-F238E27FC236}">
+                <a16:creationId xmlns:a16="http://schemas.microsoft.com/office/drawing/2014/main" id="{42AB00D0-A53D-4C4A-AD91-3198853C39D3}"/>
+              </a:ext>
+            </a:extLst>
+          </p:cNvPr>
+          <p:cNvSpPr txBox="1"/>
+          <p:nvPr/>
+        </p:nvSpPr>
+        <p:spPr>
+          <a:xfrm>
+            <a:off x="838199" y="3510631"/>
+            <a:ext cx="2604046" cy="369332"/>
+          </a:xfrm>
+          <a:prstGeom prst="rect">
+            <a:avLst/>
+          </a:prstGeom>
+          <a:solidFill>
+            <a:srgbClr val="FFC000"/>
+          </a:solidFill>
+        </p:spPr>
+        <p:txBody>
+          <a:bodyPr wrap="none" rtlCol="0">
+            <a:spAutoFit/>
+          </a:bodyPr>
+          <a:lstStyle/>
+          <a:p>
+            <a:r>
+              <a:rPr lang="en-US" dirty="0"/>
+              <a:t>Test if </a:t>
+            </a:r>
+            <a:r>
+              <a:rPr lang="en-US" i="1" dirty="0" err="1">
                 <a:solidFill>
-                  <a:srgbClr val="007DB5"/>
+                  <a:schemeClr val="accent6"/>
                 </a:solidFill>
               </a:rPr>
-              <a:t>Windows-</a:t>
-            </a:r>
-            <a:r>
-              <a:rPr lang="en-US" i="1" dirty="0" err="1">
+              <a:t>prefetch</a:t>
+            </a:r>
+            <a:r>
+              <a:rPr lang="en-US" dirty="0">
                 <a:solidFill>
-                  <a:srgbClr val="007DB5"/>
+                  <a:schemeClr val="accent6"/>
                 </a:solidFill>
               </a:rPr>
-              <a:t>Prefetch</a:t>
-            </a:r>
-            <a:r>
-              <a:rPr lang="en-US" i="1" dirty="0">
-                <a:solidFill>
-                  <a:srgbClr val="007DB5"/>
-                </a:solidFill>
-              </a:rPr>
-              <a:t>-Parser</a:t>
+              <a:t> </a:t>
+            </a:r>
+            <a:r>
+              <a:rPr lang="en-US" dirty="0"/>
+              <a:t>tool works</a:t>
+            </a:r>
+          </a:p>
+        </p:txBody>
+      </p:sp>
+      <p:sp>
+        <p:nvSpPr>
+          <p:cNvPr id="10" name="TextBox 9">
+            <a:extLst>
+              <a:ext uri="{FF2B5EF4-FFF2-40B4-BE49-F238E27FC236}">
+                <a16:creationId xmlns:a16="http://schemas.microsoft.com/office/drawing/2014/main" id="{5CBBF337-05C2-4F51-9743-8345B47BEFE1}"/>
+              </a:ext>
+            </a:extLst>
+          </p:cNvPr>
+          <p:cNvSpPr txBox="1"/>
+          <p:nvPr/>
+        </p:nvSpPr>
+        <p:spPr>
+          <a:xfrm>
+            <a:off x="838199" y="1553909"/>
+            <a:ext cx="1388778" cy="369332"/>
+          </a:xfrm>
+          <a:prstGeom prst="rect">
+            <a:avLst/>
+          </a:prstGeom>
+          <a:solidFill>
+            <a:srgbClr val="FFC000"/>
+          </a:solidFill>
+        </p:spPr>
+        <p:txBody>
+          <a:bodyPr wrap="none" rtlCol="0">
+            <a:spAutoFit/>
+          </a:bodyPr>
+          <a:lstStyle/>
+          <a:p>
+            <a:r>
+              <a:rPr lang="en-US" dirty="0"/>
+              <a:t>Install parser</a:t>
             </a:r>
           </a:p>
         </p:txBody>
@@ -17535,111 +17637,6 @@
       </p:grpSpPr>
       <p:sp>
         <p:nvSpPr>
-          <p:cNvPr id="6" name="TextBox 5"/>
-          <p:cNvSpPr txBox="1"/>
-          <p:nvPr/>
-        </p:nvSpPr>
-        <p:spPr>
-          <a:xfrm>
-            <a:off x="1182118" y="1626555"/>
-            <a:ext cx="2604046" cy="369332"/>
-          </a:xfrm>
-          <a:prstGeom prst="rect">
-            <a:avLst/>
-          </a:prstGeom>
-          <a:solidFill>
-            <a:srgbClr val="FFC000"/>
-          </a:solidFill>
-        </p:spPr>
-        <p:txBody>
-          <a:bodyPr wrap="none" rtlCol="0">
-            <a:spAutoFit/>
-          </a:bodyPr>
-          <a:lstStyle/>
-          <a:p>
-            <a:r>
-              <a:rPr lang="en-US" dirty="0"/>
-              <a:t>Test if </a:t>
-            </a:r>
-            <a:r>
-              <a:rPr lang="en-US" i="1" dirty="0" err="1">
-                <a:solidFill>
-                  <a:schemeClr val="accent6"/>
-                </a:solidFill>
-              </a:rPr>
-              <a:t>prefetch</a:t>
-            </a:r>
-            <a:r>
-              <a:rPr lang="en-US" dirty="0">
-                <a:solidFill>
-                  <a:schemeClr val="accent6"/>
-                </a:solidFill>
-              </a:rPr>
-              <a:t> </a:t>
-            </a:r>
-            <a:r>
-              <a:rPr lang="en-US" dirty="0"/>
-              <a:t>tool works</a:t>
-            </a:r>
-          </a:p>
-        </p:txBody>
-      </p:sp>
-      <p:pic>
-        <p:nvPicPr>
-          <p:cNvPr id="7" name="Picture 6"/>
-          <p:cNvPicPr>
-            <a:picLocks noChangeAspect="1"/>
-          </p:cNvPicPr>
-          <p:nvPr/>
-        </p:nvPicPr>
-        <p:blipFill>
-          <a:blip r:embed="rId3"/>
-          <a:stretch>
-            <a:fillRect/>
-          </a:stretch>
-        </p:blipFill>
-        <p:spPr>
-          <a:xfrm>
-            <a:off x="1182118" y="2016721"/>
-            <a:ext cx="9389102" cy="3270868"/>
-          </a:xfrm>
-          <a:prstGeom prst="rect">
-            <a:avLst/>
-          </a:prstGeom>
-        </p:spPr>
-      </p:pic>
-    </p:spTree>
-    <p:extLst>
-      <p:ext uri="{BB962C8B-B14F-4D97-AF65-F5344CB8AC3E}">
-        <p14:creationId xmlns:p14="http://schemas.microsoft.com/office/powerpoint/2010/main" val="3605786217"/>
-      </p:ext>
-    </p:extLst>
-  </p:cSld>
-  <p:clrMapOvr>
-    <a:masterClrMapping/>
-  </p:clrMapOvr>
-</p:sld>
-</file>
-
-<file path=ppt/slides/slide45.xml><?xml version="1.0" encoding="utf-8"?>
-<p:sld xmlns:a="http://schemas.openxmlformats.org/drawingml/2006/main" xmlns:r="http://schemas.openxmlformats.org/officeDocument/2006/relationships" xmlns:p="http://schemas.openxmlformats.org/presentationml/2006/main">
-  <p:cSld>
-    <p:spTree>
-      <p:nvGrpSpPr>
-        <p:cNvPr id="1" name=""/>
-        <p:cNvGrpSpPr/>
-        <p:nvPr/>
-      </p:nvGrpSpPr>
-      <p:grpSpPr>
-        <a:xfrm>
-          <a:off x="0" y="0"/>
-          <a:ext cx="0" cy="0"/>
-          <a:chOff x="0" y="0"/>
-          <a:chExt cx="0" cy="0"/>
-        </a:xfrm>
-      </p:grpSpPr>
-      <p:sp>
-        <p:nvSpPr>
           <p:cNvPr id="4" name="Title 3"/>
           <p:cNvSpPr>
             <a:spLocks noGrp="1"/>
@@ -17749,7 +17746,7 @@
 </p:sld>
 </file>
 
-<file path=ppt/slides/slide46.xml><?xml version="1.0" encoding="utf-8"?>
+<file path=ppt/slides/slide45.xml><?xml version="1.0" encoding="utf-8"?>
 <p:sld xmlns:a="http://schemas.openxmlformats.org/drawingml/2006/main" xmlns:r="http://schemas.openxmlformats.org/officeDocument/2006/relationships" xmlns:p="http://schemas.openxmlformats.org/presentationml/2006/main">
   <p:cSld>
     <p:spTree>

</xml_diff>

<commit_message>
modify windowsparser tool installation
</commit_message>
<xml_diff>
--- a/NIST_Data_Leakage_Case/NIST_Data_Leakage_00_Env_Setting.pptx
+++ b/NIST_Data_Leakage_Case/NIST_Data_Leakage_00_Env_Setting.pptx
@@ -5,7 +5,7 @@
     <p:sldMasterId id="2147483648" r:id="rId1"/>
   </p:sldMasterIdLst>
   <p:notesMasterIdLst>
-    <p:notesMasterId r:id="rId47"/>
+    <p:notesMasterId r:id="rId48"/>
   </p:notesMasterIdLst>
   <p:sldIdLst>
     <p:sldId id="256" r:id="rId2"/>
@@ -51,8 +51,9 @@
     <p:sldId id="273" r:id="rId42"/>
     <p:sldId id="276" r:id="rId43"/>
     <p:sldId id="312" r:id="rId44"/>
-    <p:sldId id="316" r:id="rId45"/>
-    <p:sldId id="317" r:id="rId46"/>
+    <p:sldId id="325" r:id="rId45"/>
+    <p:sldId id="316" r:id="rId46"/>
+    <p:sldId id="317" r:id="rId47"/>
   </p:sldIdLst>
   <p:sldSz cx="12192000" cy="6858000"/>
   <p:notesSz cx="6858000" cy="9144000"/>
@@ -162,7 +163,7 @@
 <file path=ppt/revisionInfo.xml><?xml version="1.0" encoding="utf-8"?>
 <p1510:revInfo xmlns:a="http://schemas.openxmlformats.org/drawingml/2006/main" xmlns:r="http://schemas.openxmlformats.org/officeDocument/2006/relationships" xmlns:p1510="http://schemas.microsoft.com/office/powerpoint/2015/10/main">
   <p1510:revLst>
-    <p1510:client id="{FC29E0CB-EC29-4F0E-A782-58C19F5D3434}" v="27" dt="2021-09-20T16:28:05.669"/>
+    <p1510:client id="{FC29E0CB-EC29-4F0E-A782-58C19F5D3434}" v="28" dt="2021-09-22T20:16:07.016"/>
   </p1510:revLst>
 </p1510:revInfo>
 </file>
@@ -743,7 +744,7 @@
   <pc:docChgLst>
     <pc:chgData name="Weifeng Xu" userId="e7aed605-a3dd-4d5a-a692-a87037af107b" providerId="ADAL" clId="{FC29E0CB-EC29-4F0E-A782-58C19F5D3434}"/>
     <pc:docChg chg="undo custSel addSld delSld modSld">
-      <pc:chgData name="Weifeng Xu" userId="e7aed605-a3dd-4d5a-a692-a87037af107b" providerId="ADAL" clId="{FC29E0CB-EC29-4F0E-A782-58C19F5D3434}" dt="2021-09-20T16:30:32.168" v="605"/>
+      <pc:chgData name="Weifeng Xu" userId="e7aed605-a3dd-4d5a-a692-a87037af107b" providerId="ADAL" clId="{FC29E0CB-EC29-4F0E-A782-58C19F5D3434}" dt="2021-09-22T20:16:23.803" v="632" actId="114"/>
       <pc:docMkLst>
         <pc:docMk/>
       </pc:docMkLst>
@@ -1286,6 +1287,37 @@
             <pc:docMk/>
             <pc:sldMk cId="705781261" sldId="324"/>
             <ac:picMk id="3" creationId="{A767EFEE-ABBF-49DE-8475-713DB24442E1}"/>
+          </ac:picMkLst>
+        </pc:picChg>
+      </pc:sldChg>
+      <pc:sldChg chg="addSp delSp modSp new mod modClrScheme chgLayout">
+        <pc:chgData name="Weifeng Xu" userId="e7aed605-a3dd-4d5a-a692-a87037af107b" providerId="ADAL" clId="{FC29E0CB-EC29-4F0E-A782-58C19F5D3434}" dt="2021-09-22T20:16:23.803" v="632" actId="114"/>
+        <pc:sldMkLst>
+          <pc:docMk/>
+          <pc:sldMk cId="1251439688" sldId="325"/>
+        </pc:sldMkLst>
+        <pc:spChg chg="del">
+          <ac:chgData name="Weifeng Xu" userId="e7aed605-a3dd-4d5a-a692-a87037af107b" providerId="ADAL" clId="{FC29E0CB-EC29-4F0E-A782-58C19F5D3434}" dt="2021-09-22T20:15:44.544" v="607" actId="700"/>
+          <ac:spMkLst>
+            <pc:docMk/>
+            <pc:sldMk cId="1251439688" sldId="325"/>
+            <ac:spMk id="2" creationId="{8BD14316-BFB1-47E9-A1E6-86D8485822BC}"/>
+          </ac:spMkLst>
+        </pc:spChg>
+        <pc:spChg chg="add mod">
+          <ac:chgData name="Weifeng Xu" userId="e7aed605-a3dd-4d5a-a692-a87037af107b" providerId="ADAL" clId="{FC29E0CB-EC29-4F0E-A782-58C19F5D3434}" dt="2021-09-22T20:16:23.803" v="632" actId="114"/>
+          <ac:spMkLst>
+            <pc:docMk/>
+            <pc:sldMk cId="1251439688" sldId="325"/>
+            <ac:spMk id="5" creationId="{E4DF9D08-35BB-42A4-B212-9166ADF7916C}"/>
+          </ac:spMkLst>
+        </pc:spChg>
+        <pc:picChg chg="add mod">
+          <ac:chgData name="Weifeng Xu" userId="e7aed605-a3dd-4d5a-a692-a87037af107b" providerId="ADAL" clId="{FC29E0CB-EC29-4F0E-A782-58C19F5D3434}" dt="2021-09-22T20:16:02.329" v="609" actId="1076"/>
+          <ac:picMkLst>
+            <pc:docMk/>
+            <pc:sldMk cId="1251439688" sldId="325"/>
+            <ac:picMk id="4" creationId="{9EE17AC1-1F19-4B03-B997-5FB2A256C820}"/>
           </ac:picMkLst>
         </pc:picChg>
       </pc:sldChg>
@@ -5065,7 +5097,7 @@
           <a:p>
             <a:fld id="{EE41F6E3-57F9-402E-BDBA-5B2DE11C8530}" type="datetimeFigureOut">
               <a:rPr lang="en-US" smtClean="0"/>
-              <a:t>9/20/2021</a:t>
+              <a:t>9/22/2021</a:t>
             </a:fld>
             <a:endParaRPr lang="en-US"/>
           </a:p>
@@ -6200,7 +6232,7 @@
           <a:p>
             <a:fld id="{DDBF98C7-164A-4723-84F0-B1E4B080DDEC}" type="slidenum">
               <a:rPr lang="en-US" smtClean="0"/>
-              <a:t>45</a:t>
+              <a:t>46</a:t>
             </a:fld>
             <a:endParaRPr lang="en-US"/>
           </a:p>
@@ -7332,7 +7364,7 @@
           <a:p>
             <a:fld id="{4263717A-E3C1-4BED-ABE0-B7069385E023}" type="datetimeFigureOut">
               <a:rPr lang="en-US" smtClean="0"/>
-              <a:t>9/20/2021</a:t>
+              <a:t>9/22/2021</a:t>
             </a:fld>
             <a:endParaRPr lang="en-US"/>
           </a:p>
@@ -7505,7 +7537,7 @@
           <a:p>
             <a:fld id="{4263717A-E3C1-4BED-ABE0-B7069385E023}" type="datetimeFigureOut">
               <a:rPr lang="en-US" smtClean="0"/>
-              <a:t>9/20/2021</a:t>
+              <a:t>9/22/2021</a:t>
             </a:fld>
             <a:endParaRPr lang="en-US"/>
           </a:p>
@@ -7683,7 +7715,7 @@
           <a:p>
             <a:fld id="{4263717A-E3C1-4BED-ABE0-B7069385E023}" type="datetimeFigureOut">
               <a:rPr lang="en-US" smtClean="0"/>
-              <a:t>9/20/2021</a:t>
+              <a:t>9/22/2021</a:t>
             </a:fld>
             <a:endParaRPr lang="en-US"/>
           </a:p>
@@ -7851,7 +7883,7 @@
           <a:p>
             <a:fld id="{4263717A-E3C1-4BED-ABE0-B7069385E023}" type="datetimeFigureOut">
               <a:rPr lang="en-US" smtClean="0"/>
-              <a:t>9/20/2021</a:t>
+              <a:t>9/22/2021</a:t>
             </a:fld>
             <a:endParaRPr lang="en-US"/>
           </a:p>
@@ -8096,7 +8128,7 @@
           <a:p>
             <a:fld id="{4263717A-E3C1-4BED-ABE0-B7069385E023}" type="datetimeFigureOut">
               <a:rPr lang="en-US" smtClean="0"/>
-              <a:t>9/20/2021</a:t>
+              <a:t>9/22/2021</a:t>
             </a:fld>
             <a:endParaRPr lang="en-US"/>
           </a:p>
@@ -8325,7 +8357,7 @@
           <a:p>
             <a:fld id="{4263717A-E3C1-4BED-ABE0-B7069385E023}" type="datetimeFigureOut">
               <a:rPr lang="en-US" smtClean="0"/>
-              <a:t>9/20/2021</a:t>
+              <a:t>9/22/2021</a:t>
             </a:fld>
             <a:endParaRPr lang="en-US"/>
           </a:p>
@@ -8689,7 +8721,7 @@
           <a:p>
             <a:fld id="{4263717A-E3C1-4BED-ABE0-B7069385E023}" type="datetimeFigureOut">
               <a:rPr lang="en-US" smtClean="0"/>
-              <a:t>9/20/2021</a:t>
+              <a:t>9/22/2021</a:t>
             </a:fld>
             <a:endParaRPr lang="en-US"/>
           </a:p>
@@ -8806,7 +8838,7 @@
           <a:p>
             <a:fld id="{4263717A-E3C1-4BED-ABE0-B7069385E023}" type="datetimeFigureOut">
               <a:rPr lang="en-US" smtClean="0"/>
-              <a:t>9/20/2021</a:t>
+              <a:t>9/22/2021</a:t>
             </a:fld>
             <a:endParaRPr lang="en-US"/>
           </a:p>
@@ -8901,7 +8933,7 @@
           <a:p>
             <a:fld id="{4263717A-E3C1-4BED-ABE0-B7069385E023}" type="datetimeFigureOut">
               <a:rPr lang="en-US" smtClean="0"/>
-              <a:t>9/20/2021</a:t>
+              <a:t>9/22/2021</a:t>
             </a:fld>
             <a:endParaRPr lang="en-US"/>
           </a:p>
@@ -9176,7 +9208,7 @@
           <a:p>
             <a:fld id="{4263717A-E3C1-4BED-ABE0-B7069385E023}" type="datetimeFigureOut">
               <a:rPr lang="en-US" smtClean="0"/>
-              <a:t>9/20/2021</a:t>
+              <a:t>9/22/2021</a:t>
             </a:fld>
             <a:endParaRPr lang="en-US"/>
           </a:p>
@@ -9428,7 +9460,7 @@
           <a:p>
             <a:fld id="{4263717A-E3C1-4BED-ABE0-B7069385E023}" type="datetimeFigureOut">
               <a:rPr lang="en-US" smtClean="0"/>
-              <a:t>9/20/2021</a:t>
+              <a:t>9/22/2021</a:t>
             </a:fld>
             <a:endParaRPr lang="en-US"/>
           </a:p>
@@ -9639,7 +9671,7 @@
           <a:p>
             <a:fld id="{4263717A-E3C1-4BED-ABE0-B7069385E023}" type="datetimeFigureOut">
               <a:rPr lang="en-US" smtClean="0"/>
-              <a:t>9/20/2021</a:t>
+              <a:t>9/22/2021</a:t>
             </a:fld>
             <a:endParaRPr lang="en-US"/>
           </a:p>
@@ -17635,6 +17667,111 @@
           <a:chExt cx="0" cy="0"/>
         </a:xfrm>
       </p:grpSpPr>
+      <p:pic>
+        <p:nvPicPr>
+          <p:cNvPr id="4" name="Picture 3">
+            <a:extLst>
+              <a:ext uri="{FF2B5EF4-FFF2-40B4-BE49-F238E27FC236}">
+                <a16:creationId xmlns:a16="http://schemas.microsoft.com/office/drawing/2014/main" id="{9EE17AC1-1F19-4B03-B997-5FB2A256C820}"/>
+              </a:ext>
+            </a:extLst>
+          </p:cNvPr>
+          <p:cNvPicPr>
+            <a:picLocks noChangeAspect="1"/>
+          </p:cNvPicPr>
+          <p:nvPr/>
+        </p:nvPicPr>
+        <p:blipFill>
+          <a:blip r:embed="rId2"/>
+          <a:stretch>
+            <a:fillRect/>
+          </a:stretch>
+        </p:blipFill>
+        <p:spPr>
+          <a:xfrm>
+            <a:off x="1264501" y="1132084"/>
+            <a:ext cx="9662997" cy="4869602"/>
+          </a:xfrm>
+          <a:prstGeom prst="rect">
+            <a:avLst/>
+          </a:prstGeom>
+        </p:spPr>
+      </p:pic>
+      <p:sp>
+        <p:nvSpPr>
+          <p:cNvPr id="5" name="TextBox 4">
+            <a:extLst>
+              <a:ext uri="{FF2B5EF4-FFF2-40B4-BE49-F238E27FC236}">
+                <a16:creationId xmlns:a16="http://schemas.microsoft.com/office/drawing/2014/main" id="{E4DF9D08-35BB-42A4-B212-9166ADF7916C}"/>
+              </a:ext>
+            </a:extLst>
+          </p:cNvPr>
+          <p:cNvSpPr txBox="1"/>
+          <p:nvPr/>
+        </p:nvSpPr>
+        <p:spPr>
+          <a:xfrm>
+            <a:off x="1264501" y="762752"/>
+            <a:ext cx="1884042" cy="369332"/>
+          </a:xfrm>
+          <a:prstGeom prst="rect">
+            <a:avLst/>
+          </a:prstGeom>
+          <a:solidFill>
+            <a:srgbClr val="FFC000"/>
+          </a:solidFill>
+        </p:spPr>
+        <p:txBody>
+          <a:bodyPr wrap="none" rtlCol="0">
+            <a:spAutoFit/>
+          </a:bodyPr>
+          <a:lstStyle/>
+          <a:p>
+            <a:r>
+              <a:rPr lang="en-US" dirty="0"/>
+              <a:t>If you are the </a:t>
+            </a:r>
+            <a:r>
+              <a:rPr lang="en-US" i="1" dirty="0">
+                <a:solidFill>
+                  <a:srgbClr val="7030A0"/>
+                </a:solidFill>
+              </a:rPr>
+              <a:t>root</a:t>
+            </a:r>
+          </a:p>
+        </p:txBody>
+      </p:sp>
+    </p:spTree>
+    <p:extLst>
+      <p:ext uri="{BB962C8B-B14F-4D97-AF65-F5344CB8AC3E}">
+        <p14:creationId xmlns:p14="http://schemas.microsoft.com/office/powerpoint/2010/main" val="1251439688"/>
+      </p:ext>
+    </p:extLst>
+  </p:cSld>
+  <p:clrMapOvr>
+    <a:masterClrMapping/>
+  </p:clrMapOvr>
+</p:sld>
+</file>
+
+<file path=ppt/slides/slide45.xml><?xml version="1.0" encoding="utf-8"?>
+<p:sld xmlns:a="http://schemas.openxmlformats.org/drawingml/2006/main" xmlns:r="http://schemas.openxmlformats.org/officeDocument/2006/relationships" xmlns:p="http://schemas.openxmlformats.org/presentationml/2006/main">
+  <p:cSld>
+    <p:spTree>
+      <p:nvGrpSpPr>
+        <p:cNvPr id="1" name=""/>
+        <p:cNvGrpSpPr/>
+        <p:nvPr/>
+      </p:nvGrpSpPr>
+      <p:grpSpPr>
+        <a:xfrm>
+          <a:off x="0" y="0"/>
+          <a:ext cx="0" cy="0"/>
+          <a:chOff x="0" y="0"/>
+          <a:chExt cx="0" cy="0"/>
+        </a:xfrm>
+      </p:grpSpPr>
       <p:sp>
         <p:nvSpPr>
           <p:cNvPr id="4" name="Title 3"/>
@@ -17746,7 +17883,7 @@
 </p:sld>
 </file>
 
-<file path=ppt/slides/slide45.xml><?xml version="1.0" encoding="utf-8"?>
+<file path=ppt/slides/slide46.xml><?xml version="1.0" encoding="utf-8"?>
 <p:sld xmlns:a="http://schemas.openxmlformats.org/drawingml/2006/main" xmlns:r="http://schemas.openxmlformats.org/officeDocument/2006/relationships" xmlns:p="http://schemas.openxmlformats.org/presentationml/2006/main">
   <p:cSld>
     <p:spTree>

</xml_diff>

<commit_message>
split anti-forensics from Volumn shadow copy
</commit_message>
<xml_diff>
--- a/NIST_Data_Leakage_Case/NIST_Data_Leakage_00_Env_Setting.pptx
+++ b/NIST_Data_Leakage_Case/NIST_Data_Leakage_00_Env_Setting.pptx
@@ -163,7 +163,7 @@
 <file path=ppt/revisionInfo.xml><?xml version="1.0" encoding="utf-8"?>
 <p1510:revInfo xmlns:a="http://schemas.openxmlformats.org/drawingml/2006/main" xmlns:r="http://schemas.openxmlformats.org/officeDocument/2006/relationships" xmlns:p1510="http://schemas.microsoft.com/office/powerpoint/2015/10/main">
   <p1510:revLst>
-    <p1510:client id="{FC29E0CB-EC29-4F0E-A782-58C19F5D3434}" v="28" dt="2021-09-22T20:16:07.016"/>
+    <p1510:client id="{FC29E0CB-EC29-4F0E-A782-58C19F5D3434}" v="29" dt="2021-10-14T19:45:55.864"/>
   </p1510:revLst>
 </p1510:revInfo>
 </file>
@@ -744,7 +744,7 @@
   <pc:docChgLst>
     <pc:chgData name="Weifeng Xu" userId="e7aed605-a3dd-4d5a-a692-a87037af107b" providerId="ADAL" clId="{FC29E0CB-EC29-4F0E-A782-58C19F5D3434}"/>
     <pc:docChg chg="undo custSel addSld delSld modSld">
-      <pc:chgData name="Weifeng Xu" userId="e7aed605-a3dd-4d5a-a692-a87037af107b" providerId="ADAL" clId="{FC29E0CB-EC29-4F0E-A782-58C19F5D3434}" dt="2021-09-22T20:16:23.803" v="632" actId="114"/>
+      <pc:chgData name="Weifeng Xu" userId="e7aed605-a3dd-4d5a-a692-a87037af107b" providerId="ADAL" clId="{FC29E0CB-EC29-4F0E-A782-58C19F5D3434}" dt="2021-10-07T13:09:06.803" v="734" actId="20577"/>
       <pc:docMkLst>
         <pc:docMk/>
       </pc:docMkLst>
@@ -874,8 +874,8 @@
           </ac:picMkLst>
         </pc:picChg>
       </pc:sldChg>
-      <pc:sldChg chg="addSp delSp modSp mod modClrScheme chgLayout">
-        <pc:chgData name="Weifeng Xu" userId="e7aed605-a3dd-4d5a-a692-a87037af107b" providerId="ADAL" clId="{FC29E0CB-EC29-4F0E-A782-58C19F5D3434}" dt="2021-08-28T14:19:43.731" v="392" actId="20577"/>
+      <pc:sldChg chg="addSp delSp modSp mod modClrScheme chgLayout modNotesTx">
+        <pc:chgData name="Weifeng Xu" userId="e7aed605-a3dd-4d5a-a692-a87037af107b" providerId="ADAL" clId="{FC29E0CB-EC29-4F0E-A782-58C19F5D3434}" dt="2021-10-07T13:09:06.803" v="734" actId="20577"/>
         <pc:sldMkLst>
           <pc:docMk/>
           <pc:sldMk cId="3686885202" sldId="278"/>
@@ -1001,13 +1001,13 @@
         </pc:spChg>
       </pc:sldChg>
       <pc:sldChg chg="addSp delSp modSp mod modNotesTx">
-        <pc:chgData name="Weifeng Xu" userId="e7aed605-a3dd-4d5a-a692-a87037af107b" providerId="ADAL" clId="{FC29E0CB-EC29-4F0E-A782-58C19F5D3434}" dt="2021-09-20T16:30:32.168" v="605"/>
+        <pc:chgData name="Weifeng Xu" userId="e7aed605-a3dd-4d5a-a692-a87037af107b" providerId="ADAL" clId="{FC29E0CB-EC29-4F0E-A782-58C19F5D3434}" dt="2021-09-28T15:13:20.724" v="713" actId="20577"/>
         <pc:sldMkLst>
           <pc:docMk/>
           <pc:sldMk cId="2709583132" sldId="312"/>
         </pc:sldMkLst>
         <pc:spChg chg="add mod">
-          <ac:chgData name="Weifeng Xu" userId="e7aed605-a3dd-4d5a-a692-a87037af107b" providerId="ADAL" clId="{FC29E0CB-EC29-4F0E-A782-58C19F5D3434}" dt="2021-09-20T16:26:01.808" v="584" actId="1076"/>
+          <ac:chgData name="Weifeng Xu" userId="e7aed605-a3dd-4d5a-a692-a87037af107b" providerId="ADAL" clId="{FC29E0CB-EC29-4F0E-A782-58C19F5D3434}" dt="2021-09-28T14:36:30.457" v="685" actId="20577"/>
           <ac:spMkLst>
             <pc:docMk/>
             <pc:sldMk cId="2709583132" sldId="312"/>
@@ -5097,7 +5097,7 @@
           <a:p>
             <a:fld id="{EE41F6E3-57F9-402E-BDBA-5B2DE11C8530}" type="datetimeFigureOut">
               <a:rPr lang="en-US" smtClean="0"/>
-              <a:t>9/22/2021</a:t>
+              <a:t>10/14/2021</a:t>
             </a:fld>
             <a:endParaRPr lang="en-US"/>
           </a:p>
@@ -6087,6 +6087,17 @@
           </a:p>
           <a:p>
             <a:r>
+              <a:rPr lang="en-US" dirty="0"/>
+              <a:t>pip install </a:t>
+            </a:r>
+            <a:r>
+              <a:rPr lang="en-US" dirty="0" err="1"/>
+              <a:t>windowsprefetch</a:t>
+            </a:r>
+            <a:endParaRPr lang="en-US" dirty="0"/>
+          </a:p>
+          <a:p>
+            <a:r>
               <a:rPr lang="en-US" dirty="0" err="1"/>
               <a:t>sudo</a:t>
             </a:r>
@@ -6121,10 +6132,9 @@
           </a:p>
           <a:p>
             <a:r>
-              <a:rPr lang="en-US"/>
+              <a:rPr lang="en-US" dirty="0"/>
               <a:t>https://medium.com/analytics-vidhya/how-to-install-and-switch-between-different-python-versions-in-ubuntu-16-04-dc1726796b9b</a:t>
             </a:r>
-            <a:endParaRPr lang="en-US" dirty="0"/>
           </a:p>
         </p:txBody>
       </p:sp>
@@ -6954,6 +6964,22 @@
             <a:r>
               <a:rPr lang="en-US" dirty="0"/>
               <a:t>losetup --detach /dev/loop0</a:t>
+            </a:r>
+          </a:p>
+          <a:p>
+            <a:r>
+              <a:rPr lang="en-US" dirty="0" err="1"/>
+              <a:t>losetup</a:t>
+            </a:r>
+            <a:r>
+              <a:rPr lang="en-US" dirty="0"/>
+              <a:t> --detach-all</a:t>
+            </a:r>
+          </a:p>
+          <a:p>
+            <a:r>
+              <a:rPr lang="en-US" dirty="0"/>
+              <a:t>them unmount</a:t>
             </a:r>
           </a:p>
           <a:p>
@@ -7364,7 +7390,7 @@
           <a:p>
             <a:fld id="{4263717A-E3C1-4BED-ABE0-B7069385E023}" type="datetimeFigureOut">
               <a:rPr lang="en-US" smtClean="0"/>
-              <a:t>9/22/2021</a:t>
+              <a:t>10/14/2021</a:t>
             </a:fld>
             <a:endParaRPr lang="en-US"/>
           </a:p>
@@ -7537,7 +7563,7 @@
           <a:p>
             <a:fld id="{4263717A-E3C1-4BED-ABE0-B7069385E023}" type="datetimeFigureOut">
               <a:rPr lang="en-US" smtClean="0"/>
-              <a:t>9/22/2021</a:t>
+              <a:t>10/14/2021</a:t>
             </a:fld>
             <a:endParaRPr lang="en-US"/>
           </a:p>
@@ -7715,7 +7741,7 @@
           <a:p>
             <a:fld id="{4263717A-E3C1-4BED-ABE0-B7069385E023}" type="datetimeFigureOut">
               <a:rPr lang="en-US" smtClean="0"/>
-              <a:t>9/22/2021</a:t>
+              <a:t>10/14/2021</a:t>
             </a:fld>
             <a:endParaRPr lang="en-US"/>
           </a:p>
@@ -7883,7 +7909,7 @@
           <a:p>
             <a:fld id="{4263717A-E3C1-4BED-ABE0-B7069385E023}" type="datetimeFigureOut">
               <a:rPr lang="en-US" smtClean="0"/>
-              <a:t>9/22/2021</a:t>
+              <a:t>10/14/2021</a:t>
             </a:fld>
             <a:endParaRPr lang="en-US"/>
           </a:p>
@@ -8128,7 +8154,7 @@
           <a:p>
             <a:fld id="{4263717A-E3C1-4BED-ABE0-B7069385E023}" type="datetimeFigureOut">
               <a:rPr lang="en-US" smtClean="0"/>
-              <a:t>9/22/2021</a:t>
+              <a:t>10/14/2021</a:t>
             </a:fld>
             <a:endParaRPr lang="en-US"/>
           </a:p>
@@ -8357,7 +8383,7 @@
           <a:p>
             <a:fld id="{4263717A-E3C1-4BED-ABE0-B7069385E023}" type="datetimeFigureOut">
               <a:rPr lang="en-US" smtClean="0"/>
-              <a:t>9/22/2021</a:t>
+              <a:t>10/14/2021</a:t>
             </a:fld>
             <a:endParaRPr lang="en-US"/>
           </a:p>
@@ -8721,7 +8747,7 @@
           <a:p>
             <a:fld id="{4263717A-E3C1-4BED-ABE0-B7069385E023}" type="datetimeFigureOut">
               <a:rPr lang="en-US" smtClean="0"/>
-              <a:t>9/22/2021</a:t>
+              <a:t>10/14/2021</a:t>
             </a:fld>
             <a:endParaRPr lang="en-US"/>
           </a:p>
@@ -8838,7 +8864,7 @@
           <a:p>
             <a:fld id="{4263717A-E3C1-4BED-ABE0-B7069385E023}" type="datetimeFigureOut">
               <a:rPr lang="en-US" smtClean="0"/>
-              <a:t>9/22/2021</a:t>
+              <a:t>10/14/2021</a:t>
             </a:fld>
             <a:endParaRPr lang="en-US"/>
           </a:p>
@@ -8933,7 +8959,7 @@
           <a:p>
             <a:fld id="{4263717A-E3C1-4BED-ABE0-B7069385E023}" type="datetimeFigureOut">
               <a:rPr lang="en-US" smtClean="0"/>
-              <a:t>9/22/2021</a:t>
+              <a:t>10/14/2021</a:t>
             </a:fld>
             <a:endParaRPr lang="en-US"/>
           </a:p>
@@ -9208,7 +9234,7 @@
           <a:p>
             <a:fld id="{4263717A-E3C1-4BED-ABE0-B7069385E023}" type="datetimeFigureOut">
               <a:rPr lang="en-US" smtClean="0"/>
-              <a:t>9/22/2021</a:t>
+              <a:t>10/14/2021</a:t>
             </a:fld>
             <a:endParaRPr lang="en-US"/>
           </a:p>
@@ -9460,7 +9486,7 @@
           <a:p>
             <a:fld id="{4263717A-E3C1-4BED-ABE0-B7069385E023}" type="datetimeFigureOut">
               <a:rPr lang="en-US" smtClean="0"/>
-              <a:t>9/22/2021</a:t>
+              <a:t>10/14/2021</a:t>
             </a:fld>
             <a:endParaRPr lang="en-US"/>
           </a:p>
@@ -9671,7 +9697,7 @@
           <a:p>
             <a:fld id="{4263717A-E3C1-4BED-ABE0-B7069385E023}" type="datetimeFigureOut">
               <a:rPr lang="en-US" smtClean="0"/>
-              <a:t>9/22/2021</a:t>
+              <a:t>10/14/2021</a:t>
             </a:fld>
             <a:endParaRPr lang="en-US"/>
           </a:p>
@@ -17558,7 +17584,7 @@
         <p:spPr>
           <a:xfrm>
             <a:off x="838199" y="3510631"/>
-            <a:ext cx="2604046" cy="369332"/>
+            <a:ext cx="6582828" cy="369332"/>
           </a:xfrm>
           <a:prstGeom prst="rect">
             <a:avLst/>
@@ -17578,7 +17604,7 @@
               <a:t>Test if </a:t>
             </a:r>
             <a:r>
-              <a:rPr lang="en-US" i="1" dirty="0" err="1">
+              <a:rPr lang="en-US" i="1" dirty="0">
                 <a:solidFill>
                   <a:schemeClr val="accent6"/>
                 </a:solidFill>
@@ -17595,8 +17621,13 @@
             </a:r>
             <a:r>
               <a:rPr lang="en-US" dirty="0"/>
-              <a:t>tool works</a:t>
-            </a:r>
+              <a:t>tool works (you can skip if your python </a:t>
+            </a:r>
+            <a:r>
+              <a:rPr lang="en-US"/>
+              <a:t>version is 3.9)</a:t>
+            </a:r>
+            <a:endParaRPr lang="en-US" dirty="0"/>
           </a:p>
         </p:txBody>
       </p:sp>

</xml_diff>